<commit_message>
Cambio ppt SOLID rubrica 2026
</commit_message>
<xml_diff>
--- a/Slides/3. Principios_SOLID.pptx
+++ b/Slides/3. Principios_SOLID.pptx
@@ -2907,7 +2907,7 @@
   <pc:docChgLst>
     <pc:chgData name="Cesar Augusto Lopez Gallego" userId="0dfa9112-9251-4882-b472-cf2dfcee09d1" providerId="ADAL" clId="{3DCD5389-CEAF-4D12-BA12-34DB4383BE2E}"/>
     <pc:docChg chg="undo custSel addSld delSld modSld">
-      <pc:chgData name="Cesar Augusto Lopez Gallego" userId="0dfa9112-9251-4882-b472-cf2dfcee09d1" providerId="ADAL" clId="{3DCD5389-CEAF-4D12-BA12-34DB4383BE2E}" dt="2026-02-03T15:24:30.045" v="806" actId="20577"/>
+      <pc:chgData name="Cesar Augusto Lopez Gallego" userId="0dfa9112-9251-4882-b472-cf2dfcee09d1" providerId="ADAL" clId="{3DCD5389-CEAF-4D12-BA12-34DB4383BE2E}" dt="2026-02-11T12:24:45.020" v="1113" actId="20577"/>
       <pc:docMkLst>
         <pc:docMk/>
       </pc:docMkLst>
@@ -3223,6 +3223,60 @@
             <pc:docMk/>
             <pc:sldMk cId="1197823999" sldId="302"/>
             <ac:spMk id="4" creationId="{B9B290D4-6976-EA75-D09F-E03CC66EB1BA}"/>
+          </ac:spMkLst>
+        </pc:spChg>
+      </pc:sldChg>
+      <pc:sldChg chg="modSp mod">
+        <pc:chgData name="Cesar Augusto Lopez Gallego" userId="0dfa9112-9251-4882-b472-cf2dfcee09d1" providerId="ADAL" clId="{3DCD5389-CEAF-4D12-BA12-34DB4383BE2E}" dt="2026-02-11T12:24:45.020" v="1113" actId="20577"/>
+        <pc:sldMkLst>
+          <pc:docMk/>
+          <pc:sldMk cId="422681083" sldId="305"/>
+        </pc:sldMkLst>
+        <pc:spChg chg="mod">
+          <ac:chgData name="Cesar Augusto Lopez Gallego" userId="0dfa9112-9251-4882-b472-cf2dfcee09d1" providerId="ADAL" clId="{3DCD5389-CEAF-4D12-BA12-34DB4383BE2E}" dt="2026-02-11T12:24:45.020" v="1113" actId="20577"/>
+          <ac:spMkLst>
+            <pc:docMk/>
+            <pc:sldMk cId="422681083" sldId="305"/>
+            <ac:spMk id="6" creationId="{5C0C99DA-22F6-46E8-BA20-C0B99D54A67D}"/>
+          </ac:spMkLst>
+        </pc:spChg>
+      </pc:sldChg>
+      <pc:sldChg chg="modSp mod">
+        <pc:chgData name="Cesar Augusto Lopez Gallego" userId="0dfa9112-9251-4882-b472-cf2dfcee09d1" providerId="ADAL" clId="{3DCD5389-CEAF-4D12-BA12-34DB4383BE2E}" dt="2026-02-11T12:23:50.003" v="990" actId="20577"/>
+        <pc:sldMkLst>
+          <pc:docMk/>
+          <pc:sldMk cId="565602947" sldId="306"/>
+        </pc:sldMkLst>
+        <pc:spChg chg="mod">
+          <ac:chgData name="Cesar Augusto Lopez Gallego" userId="0dfa9112-9251-4882-b472-cf2dfcee09d1" providerId="ADAL" clId="{3DCD5389-CEAF-4D12-BA12-34DB4383BE2E}" dt="2026-02-11T12:23:45.449" v="987" actId="20577"/>
+          <ac:spMkLst>
+            <pc:docMk/>
+            <pc:sldMk cId="565602947" sldId="306"/>
+            <ac:spMk id="2" creationId="{67B01726-0EC2-430D-8B81-B1FCF708CAEE}"/>
+          </ac:spMkLst>
+        </pc:spChg>
+        <pc:spChg chg="mod">
+          <ac:chgData name="Cesar Augusto Lopez Gallego" userId="0dfa9112-9251-4882-b472-cf2dfcee09d1" providerId="ADAL" clId="{3DCD5389-CEAF-4D12-BA12-34DB4383BE2E}" dt="2026-02-11T12:23:21.439" v="983" actId="20577"/>
+          <ac:spMkLst>
+            <pc:docMk/>
+            <pc:sldMk cId="565602947" sldId="306"/>
+            <ac:spMk id="5" creationId="{8585E7C0-048A-41D8-9A63-A5A5FC2B82C0}"/>
+          </ac:spMkLst>
+        </pc:spChg>
+        <pc:spChg chg="mod">
+          <ac:chgData name="Cesar Augusto Lopez Gallego" userId="0dfa9112-9251-4882-b472-cf2dfcee09d1" providerId="ADAL" clId="{3DCD5389-CEAF-4D12-BA12-34DB4383BE2E}" dt="2026-02-11T12:23:42.486" v="985" actId="20577"/>
+          <ac:spMkLst>
+            <pc:docMk/>
+            <pc:sldMk cId="565602947" sldId="306"/>
+            <ac:spMk id="7" creationId="{CAA86407-759D-4645-8317-502DA4984741}"/>
+          </ac:spMkLst>
+        </pc:spChg>
+        <pc:spChg chg="mod">
+          <ac:chgData name="Cesar Augusto Lopez Gallego" userId="0dfa9112-9251-4882-b472-cf2dfcee09d1" providerId="ADAL" clId="{3DCD5389-CEAF-4D12-BA12-34DB4383BE2E}" dt="2026-02-11T12:23:50.003" v="990" actId="20577"/>
+          <ac:spMkLst>
+            <pc:docMk/>
+            <pc:sldMk cId="565602947" sldId="306"/>
+            <ac:spMk id="8" creationId="{C736D5E5-4998-49FF-BA2F-F3A1D75F7DDA}"/>
           </ac:spMkLst>
         </pc:spChg>
       </pc:sldChg>
@@ -5169,7 +5223,7 @@
           <a:p>
             <a:fld id="{6B86245D-015E-46AE-96CC-32E8A5E9A1DF}" type="datetimeFigureOut">
               <a:rPr lang="es-CO" smtClean="0"/>
-              <a:t>3/02/2026</a:t>
+              <a:t>11/02/2026</a:t>
             </a:fld>
             <a:endParaRPr lang="es-CO"/>
           </a:p>
@@ -5415,7 +5469,7 @@
           <a:p>
             <a:fld id="{6B86245D-015E-46AE-96CC-32E8A5E9A1DF}" type="datetimeFigureOut">
               <a:rPr lang="es-CO" smtClean="0"/>
-              <a:t>3/02/2026</a:t>
+              <a:t>11/02/2026</a:t>
             </a:fld>
             <a:endParaRPr lang="es-CO"/>
           </a:p>
@@ -5585,7 +5639,7 @@
           <a:p>
             <a:fld id="{6B86245D-015E-46AE-96CC-32E8A5E9A1DF}" type="datetimeFigureOut">
               <a:rPr lang="es-CO" smtClean="0"/>
-              <a:t>3/02/2026</a:t>
+              <a:t>11/02/2026</a:t>
             </a:fld>
             <a:endParaRPr lang="es-CO"/>
           </a:p>
@@ -5817,7 +5871,7 @@
           <a:p>
             <a:fld id="{6B86245D-015E-46AE-96CC-32E8A5E9A1DF}" type="datetimeFigureOut">
               <a:rPr lang="es-CO" smtClean="0"/>
-              <a:t>3/02/2026</a:t>
+              <a:t>11/02/2026</a:t>
             </a:fld>
             <a:endParaRPr lang="es-CO"/>
           </a:p>
@@ -6009,7 +6063,7 @@
           <a:p>
             <a:fld id="{6B86245D-015E-46AE-96CC-32E8A5E9A1DF}" type="datetimeFigureOut">
               <a:rPr lang="es-CO" smtClean="0"/>
-              <a:t>3/02/2026</a:t>
+              <a:t>11/02/2026</a:t>
             </a:fld>
             <a:endParaRPr lang="es-CO"/>
           </a:p>
@@ -34989,7 +35043,7 @@
                   <a:schemeClr val="tx1"/>
                 </a:solidFill>
               </a:rPr>
-              <a:t>Cada grupo tendrá 20 minutos.</a:t>
+              <a:t>Cada grupo (de máximo 3 integrantes) realizará un vídeo de máximo 15 minutos y me lo comparte (por favor no adjuntarlo). A más tardar el lunes 16 de febrero antes de media noche.</a:t>
             </a:r>
           </a:p>
           <a:p>
@@ -35003,7 +35057,7 @@
                   <a:schemeClr val="tx1"/>
                 </a:solidFill>
               </a:rPr>
-              <a:t>15  minutos para exponer con lujo de detalles, el rediseño aplicando los principios SOLID y la implementación de esta forma:</a:t>
+              <a:t>Deberán exponer con lujo de detalles, el rediseño aplicando los principios SOLID y la implementación de esta forma:</a:t>
             </a:r>
           </a:p>
           <a:p>
@@ -35049,19 +35103,11 @@
             </a:r>
           </a:p>
           <a:p>
-            <a:pPr marL="285750" indent="-285750">
+            <a:pPr marL="742950" lvl="1" indent="-285750">
               <a:buFont typeface="Arial" panose="020B0604020202020204" pitchFamily="34" charset="0"/>
               <a:buChar char="•"/>
             </a:pPr>
-            <a:r>
-              <a:rPr lang="es-ES" dirty="0">
-                <a:solidFill>
-                  <a:schemeClr val="tx1"/>
-                </a:solidFill>
-              </a:rPr>
-              <a:t>5 Minutos restantes, preguntas</a:t>
-            </a:r>
-            <a:endParaRPr lang="es-419" dirty="0">
+            <a:endParaRPr lang="es-ES" dirty="0">
               <a:solidFill>
                 <a:schemeClr val="tx1"/>
               </a:solidFill>
@@ -35254,7 +35300,7 @@
                   <a:schemeClr val="tx1"/>
                 </a:solidFill>
               </a:rPr>
-              <a:t>3 Puntos: con los que cuentan para cada evaluación bajo las condiciones del primer día del semestre</a:t>
+              <a:t>15 puntos: el trabajo de grupo que realizaron con el proyecto MVC entregado</a:t>
             </a:r>
           </a:p>
           <a:p>
@@ -35268,21 +35314,7 @@
                   <a:schemeClr val="tx1"/>
                 </a:solidFill>
               </a:rPr>
-              <a:t>5 puntos: de las actividades de introducción a la arquitectura semana 3</a:t>
-            </a:r>
-          </a:p>
-          <a:p>
-            <a:pPr marL="285750" indent="-285750">
-              <a:buFont typeface="Arial" panose="020B0604020202020204" pitchFamily="34" charset="0"/>
-              <a:buChar char="•"/>
-            </a:pPr>
-            <a:r>
-              <a:rPr lang="es-ES" dirty="0">
-                <a:solidFill>
-                  <a:schemeClr val="tx1"/>
-                </a:solidFill>
-              </a:rPr>
-              <a:t>42 puntos: Aplicación de los principios SOLID a un proyecto previo hecho aplicando el paradigma de objetos. UML notación Extendida+ Implementación en C#  otro lenguaje orientado a objetos</a:t>
+              <a:t>35 puntos: Aplicación de los principios SOLID a un proyecto previo hecho aplicando el paradigma de objetos. UML notación Extendida+ Implementación en C#  otro lenguaje orientado a objetos</a:t>
             </a:r>
           </a:p>
           <a:p>
@@ -35349,7 +35381,7 @@
             <a:pPr algn="ctr"/>
             <a:r>
               <a:rPr lang="es-ES" sz="1600" dirty="0"/>
-              <a:t>12 puntos</a:t>
+              <a:t>10 puntos</a:t>
             </a:r>
             <a:endParaRPr lang="es-419" sz="1600" dirty="0"/>
           </a:p>
@@ -35406,7 +35438,7 @@
             <a:pPr algn="ctr"/>
             <a:r>
               <a:rPr lang="es-ES" sz="1600" dirty="0"/>
-              <a:t>18 puntos</a:t>
+              <a:t>15 puntos</a:t>
             </a:r>
             <a:endParaRPr lang="es-419" sz="1600" dirty="0"/>
           </a:p>
@@ -35463,7 +35495,7 @@
             <a:pPr algn="ctr"/>
             <a:r>
               <a:rPr lang="es-ES" sz="1600" dirty="0"/>
-              <a:t>12puntos</a:t>
+              <a:t>10 puntos</a:t>
             </a:r>
             <a:endParaRPr lang="es-419" sz="1600" dirty="0"/>
           </a:p>

</xml_diff>